<commit_message>
Changed ER diagram in old ppt
</commit_message>
<xml_diff>
--- a/finalprojectERdiagram.pptx
+++ b/finalprojectERdiagram.pptx
@@ -104,7 +104,16 @@
       </a:defRPr>
     </a:lvl9pPr>
   </p:defaultTextStyle>
+  <p:extLst>
+    <p:ext uri="{EFAFB233-063F-42B5-8137-9DF3F51BA10A}">
+      <p15:sldGuideLst xmlns:p15="http://schemas.microsoft.com/office/powerpoint/2012/main"/>
+    </p:ext>
+  </p:extLst>
 </p:presentation>
+</file>
+
+<file path=ppt/revisionInfo.xml><?xml version="1.0" encoding="utf-8"?>
+<p1510:revInfo xmlns:a="http://schemas.openxmlformats.org/drawingml/2006/main" xmlns:r="http://schemas.openxmlformats.org/officeDocument/2006/relationships" xmlns:p1510="http://schemas.microsoft.com/office/powerpoint/2015/10/main"/>
 </file>
 
 <file path=ppt/slideLayouts/slideLayout1.xml><?xml version="1.0" encoding="utf-8"?>
@@ -149,10 +158,9 @@
           </a:lstStyle>
           <a:p>
             <a:r>
-              <a:rPr lang="en-US" smtClean="0"/>
+              <a:rPr lang="en-US"/>
               <a:t>Click to edit Master title style</a:t>
             </a:r>
-            <a:endParaRPr lang="en-US"/>
           </a:p>
         </p:txBody>
       </p:sp>
@@ -214,10 +222,9 @@
           </a:lstStyle>
           <a:p>
             <a:r>
-              <a:rPr lang="en-US" smtClean="0"/>
+              <a:rPr lang="en-US"/>
               <a:t>Click to edit Master subtitle style</a:t>
             </a:r>
-            <a:endParaRPr lang="en-US"/>
           </a:p>
         </p:txBody>
       </p:sp>
@@ -238,9 +245,9 @@
           <a:p>
             <a:fld id="{1AE64D37-BC85-964B-8C5D-8815EAD8EE1E}" type="datetimeFigureOut">
               <a:rPr lang="en-US" smtClean="0"/>
-              <a:t>11/21/17</a:t>
+              <a:t>12/4/2017</a:t>
             </a:fld>
-            <a:endParaRPr lang="en-US"/>
+            <a:endParaRPr lang="en-US" dirty="0"/>
           </a:p>
         </p:txBody>
       </p:sp>
@@ -259,7 +266,7 @@
           <a:bodyPr/>
           <a:lstStyle/>
           <a:p>
-            <a:endParaRPr lang="en-US"/>
+            <a:endParaRPr lang="en-US" dirty="0"/>
           </a:p>
         </p:txBody>
       </p:sp>
@@ -282,7 +289,7 @@
               <a:rPr lang="en-US" smtClean="0"/>
               <a:t>‹#›</a:t>
             </a:fld>
-            <a:endParaRPr lang="en-US"/>
+            <a:endParaRPr lang="en-US" dirty="0"/>
           </a:p>
         </p:txBody>
       </p:sp>
@@ -332,10 +339,9 @@
           <a:lstStyle/>
           <a:p>
             <a:r>
-              <a:rPr lang="en-US" smtClean="0"/>
+              <a:rPr lang="en-US"/>
               <a:t>Click to edit Master title style</a:t>
             </a:r>
-            <a:endParaRPr lang="en-US"/>
           </a:p>
         </p:txBody>
       </p:sp>
@@ -356,38 +362,37 @@
           <a:p>
             <a:pPr lvl="0"/>
             <a:r>
-              <a:rPr lang="en-US" smtClean="0"/>
+              <a:rPr lang="en-US"/>
               <a:t>Click to edit Master text styles</a:t>
             </a:r>
           </a:p>
           <a:p>
             <a:pPr lvl="1"/>
             <a:r>
-              <a:rPr lang="en-US" smtClean="0"/>
+              <a:rPr lang="en-US"/>
               <a:t>Second level</a:t>
             </a:r>
           </a:p>
           <a:p>
             <a:pPr lvl="2"/>
             <a:r>
-              <a:rPr lang="en-US" smtClean="0"/>
+              <a:rPr lang="en-US"/>
               <a:t>Third level</a:t>
             </a:r>
           </a:p>
           <a:p>
             <a:pPr lvl="3"/>
             <a:r>
-              <a:rPr lang="en-US" smtClean="0"/>
+              <a:rPr lang="en-US"/>
               <a:t>Fourth level</a:t>
             </a:r>
           </a:p>
           <a:p>
             <a:pPr lvl="4"/>
             <a:r>
-              <a:rPr lang="en-US" smtClean="0"/>
+              <a:rPr lang="en-US"/>
               <a:t>Fifth level</a:t>
             </a:r>
-            <a:endParaRPr lang="en-US"/>
           </a:p>
         </p:txBody>
       </p:sp>
@@ -408,9 +413,9 @@
           <a:p>
             <a:fld id="{1AE64D37-BC85-964B-8C5D-8815EAD8EE1E}" type="datetimeFigureOut">
               <a:rPr lang="en-US" smtClean="0"/>
-              <a:t>11/21/17</a:t>
+              <a:t>12/4/2017</a:t>
             </a:fld>
-            <a:endParaRPr lang="en-US"/>
+            <a:endParaRPr lang="en-US" dirty="0"/>
           </a:p>
         </p:txBody>
       </p:sp>
@@ -429,7 +434,7 @@
           <a:bodyPr/>
           <a:lstStyle/>
           <a:p>
-            <a:endParaRPr lang="en-US"/>
+            <a:endParaRPr lang="en-US" dirty="0"/>
           </a:p>
         </p:txBody>
       </p:sp>
@@ -452,7 +457,7 @@
               <a:rPr lang="en-US" smtClean="0"/>
               <a:t>‹#›</a:t>
             </a:fld>
-            <a:endParaRPr lang="en-US"/>
+            <a:endParaRPr lang="en-US" dirty="0"/>
           </a:p>
         </p:txBody>
       </p:sp>
@@ -507,10 +512,9 @@
           <a:lstStyle/>
           <a:p>
             <a:r>
-              <a:rPr lang="en-US" smtClean="0"/>
+              <a:rPr lang="en-US"/>
               <a:t>Click to edit Master title style</a:t>
             </a:r>
-            <a:endParaRPr lang="en-US"/>
           </a:p>
         </p:txBody>
       </p:sp>
@@ -536,38 +540,37 @@
           <a:p>
             <a:pPr lvl="0"/>
             <a:r>
-              <a:rPr lang="en-US" smtClean="0"/>
+              <a:rPr lang="en-US"/>
               <a:t>Click to edit Master text styles</a:t>
             </a:r>
           </a:p>
           <a:p>
             <a:pPr lvl="1"/>
             <a:r>
-              <a:rPr lang="en-US" smtClean="0"/>
+              <a:rPr lang="en-US"/>
               <a:t>Second level</a:t>
             </a:r>
           </a:p>
           <a:p>
             <a:pPr lvl="2"/>
             <a:r>
-              <a:rPr lang="en-US" smtClean="0"/>
+              <a:rPr lang="en-US"/>
               <a:t>Third level</a:t>
             </a:r>
           </a:p>
           <a:p>
             <a:pPr lvl="3"/>
             <a:r>
-              <a:rPr lang="en-US" smtClean="0"/>
+              <a:rPr lang="en-US"/>
               <a:t>Fourth level</a:t>
             </a:r>
           </a:p>
           <a:p>
             <a:pPr lvl="4"/>
             <a:r>
-              <a:rPr lang="en-US" smtClean="0"/>
+              <a:rPr lang="en-US"/>
               <a:t>Fifth level</a:t>
             </a:r>
-            <a:endParaRPr lang="en-US"/>
           </a:p>
         </p:txBody>
       </p:sp>
@@ -588,9 +591,9 @@
           <a:p>
             <a:fld id="{1AE64D37-BC85-964B-8C5D-8815EAD8EE1E}" type="datetimeFigureOut">
               <a:rPr lang="en-US" smtClean="0"/>
-              <a:t>11/21/17</a:t>
+              <a:t>12/4/2017</a:t>
             </a:fld>
-            <a:endParaRPr lang="en-US"/>
+            <a:endParaRPr lang="en-US" dirty="0"/>
           </a:p>
         </p:txBody>
       </p:sp>
@@ -609,7 +612,7 @@
           <a:bodyPr/>
           <a:lstStyle/>
           <a:p>
-            <a:endParaRPr lang="en-US"/>
+            <a:endParaRPr lang="en-US" dirty="0"/>
           </a:p>
         </p:txBody>
       </p:sp>
@@ -632,7 +635,7 @@
               <a:rPr lang="en-US" smtClean="0"/>
               <a:t>‹#›</a:t>
             </a:fld>
-            <a:endParaRPr lang="en-US"/>
+            <a:endParaRPr lang="en-US" dirty="0"/>
           </a:p>
         </p:txBody>
       </p:sp>
@@ -682,10 +685,9 @@
           <a:lstStyle/>
           <a:p>
             <a:r>
-              <a:rPr lang="en-US" smtClean="0"/>
+              <a:rPr lang="en-US"/>
               <a:t>Click to edit Master title style</a:t>
             </a:r>
-            <a:endParaRPr lang="en-US"/>
           </a:p>
         </p:txBody>
       </p:sp>
@@ -706,38 +708,37 @@
           <a:p>
             <a:pPr lvl="0"/>
             <a:r>
-              <a:rPr lang="en-US" smtClean="0"/>
+              <a:rPr lang="en-US"/>
               <a:t>Click to edit Master text styles</a:t>
             </a:r>
           </a:p>
           <a:p>
             <a:pPr lvl="1"/>
             <a:r>
-              <a:rPr lang="en-US" smtClean="0"/>
+              <a:rPr lang="en-US"/>
               <a:t>Second level</a:t>
             </a:r>
           </a:p>
           <a:p>
             <a:pPr lvl="2"/>
             <a:r>
-              <a:rPr lang="en-US" smtClean="0"/>
+              <a:rPr lang="en-US"/>
               <a:t>Third level</a:t>
             </a:r>
           </a:p>
           <a:p>
             <a:pPr lvl="3"/>
             <a:r>
-              <a:rPr lang="en-US" smtClean="0"/>
+              <a:rPr lang="en-US"/>
               <a:t>Fourth level</a:t>
             </a:r>
           </a:p>
           <a:p>
             <a:pPr lvl="4"/>
             <a:r>
-              <a:rPr lang="en-US" smtClean="0"/>
+              <a:rPr lang="en-US"/>
               <a:t>Fifth level</a:t>
             </a:r>
-            <a:endParaRPr lang="en-US"/>
           </a:p>
         </p:txBody>
       </p:sp>
@@ -758,9 +759,9 @@
           <a:p>
             <a:fld id="{1AE64D37-BC85-964B-8C5D-8815EAD8EE1E}" type="datetimeFigureOut">
               <a:rPr lang="en-US" smtClean="0"/>
-              <a:t>11/21/17</a:t>
+              <a:t>12/4/2017</a:t>
             </a:fld>
-            <a:endParaRPr lang="en-US"/>
+            <a:endParaRPr lang="en-US" dirty="0"/>
           </a:p>
         </p:txBody>
       </p:sp>
@@ -779,7 +780,7 @@
           <a:bodyPr/>
           <a:lstStyle/>
           <a:p>
-            <a:endParaRPr lang="en-US"/>
+            <a:endParaRPr lang="en-US" dirty="0"/>
           </a:p>
         </p:txBody>
       </p:sp>
@@ -802,7 +803,7 @@
               <a:rPr lang="en-US" smtClean="0"/>
               <a:t>‹#›</a:t>
             </a:fld>
-            <a:endParaRPr lang="en-US"/>
+            <a:endParaRPr lang="en-US" dirty="0"/>
           </a:p>
         </p:txBody>
       </p:sp>
@@ -861,10 +862,9 @@
           </a:lstStyle>
           <a:p>
             <a:r>
-              <a:rPr lang="en-US" smtClean="0"/>
+              <a:rPr lang="en-US"/>
               <a:t>Click to edit Master title style</a:t>
             </a:r>
-            <a:endParaRPr lang="en-US"/>
           </a:p>
         </p:txBody>
       </p:sp>
@@ -981,7 +981,7 @@
           <a:p>
             <a:pPr lvl="0"/>
             <a:r>
-              <a:rPr lang="en-US" smtClean="0"/>
+              <a:rPr lang="en-US"/>
               <a:t>Click to edit Master text styles</a:t>
             </a:r>
           </a:p>
@@ -1004,9 +1004,9 @@
           <a:p>
             <a:fld id="{1AE64D37-BC85-964B-8C5D-8815EAD8EE1E}" type="datetimeFigureOut">
               <a:rPr lang="en-US" smtClean="0"/>
-              <a:t>11/21/17</a:t>
+              <a:t>12/4/2017</a:t>
             </a:fld>
-            <a:endParaRPr lang="en-US"/>
+            <a:endParaRPr lang="en-US" dirty="0"/>
           </a:p>
         </p:txBody>
       </p:sp>
@@ -1025,7 +1025,7 @@
           <a:bodyPr/>
           <a:lstStyle/>
           <a:p>
-            <a:endParaRPr lang="en-US"/>
+            <a:endParaRPr lang="en-US" dirty="0"/>
           </a:p>
         </p:txBody>
       </p:sp>
@@ -1048,7 +1048,7 @@
               <a:rPr lang="en-US" smtClean="0"/>
               <a:t>‹#›</a:t>
             </a:fld>
-            <a:endParaRPr lang="en-US"/>
+            <a:endParaRPr lang="en-US" dirty="0"/>
           </a:p>
         </p:txBody>
       </p:sp>
@@ -1098,10 +1098,9 @@
           <a:lstStyle/>
           <a:p>
             <a:r>
-              <a:rPr lang="en-US" smtClean="0"/>
+              <a:rPr lang="en-US"/>
               <a:t>Click to edit Master title style</a:t>
             </a:r>
-            <a:endParaRPr lang="en-US"/>
           </a:p>
         </p:txBody>
       </p:sp>
@@ -1127,38 +1126,37 @@
           <a:p>
             <a:pPr lvl="0"/>
             <a:r>
-              <a:rPr lang="en-US" smtClean="0"/>
+              <a:rPr lang="en-US"/>
               <a:t>Click to edit Master text styles</a:t>
             </a:r>
           </a:p>
           <a:p>
             <a:pPr lvl="1"/>
             <a:r>
-              <a:rPr lang="en-US" smtClean="0"/>
+              <a:rPr lang="en-US"/>
               <a:t>Second level</a:t>
             </a:r>
           </a:p>
           <a:p>
             <a:pPr lvl="2"/>
             <a:r>
-              <a:rPr lang="en-US" smtClean="0"/>
+              <a:rPr lang="en-US"/>
               <a:t>Third level</a:t>
             </a:r>
           </a:p>
           <a:p>
             <a:pPr lvl="3"/>
             <a:r>
-              <a:rPr lang="en-US" smtClean="0"/>
+              <a:rPr lang="en-US"/>
               <a:t>Fourth level</a:t>
             </a:r>
           </a:p>
           <a:p>
             <a:pPr lvl="4"/>
             <a:r>
-              <a:rPr lang="en-US" smtClean="0"/>
+              <a:rPr lang="en-US"/>
               <a:t>Fifth level</a:t>
             </a:r>
-            <a:endParaRPr lang="en-US"/>
           </a:p>
         </p:txBody>
       </p:sp>
@@ -1184,38 +1182,37 @@
           <a:p>
             <a:pPr lvl="0"/>
             <a:r>
-              <a:rPr lang="en-US" smtClean="0"/>
+              <a:rPr lang="en-US"/>
               <a:t>Click to edit Master text styles</a:t>
             </a:r>
           </a:p>
           <a:p>
             <a:pPr lvl="1"/>
             <a:r>
-              <a:rPr lang="en-US" smtClean="0"/>
+              <a:rPr lang="en-US"/>
               <a:t>Second level</a:t>
             </a:r>
           </a:p>
           <a:p>
             <a:pPr lvl="2"/>
             <a:r>
-              <a:rPr lang="en-US" smtClean="0"/>
+              <a:rPr lang="en-US"/>
               <a:t>Third level</a:t>
             </a:r>
           </a:p>
           <a:p>
             <a:pPr lvl="3"/>
             <a:r>
-              <a:rPr lang="en-US" smtClean="0"/>
+              <a:rPr lang="en-US"/>
               <a:t>Fourth level</a:t>
             </a:r>
           </a:p>
           <a:p>
             <a:pPr lvl="4"/>
             <a:r>
-              <a:rPr lang="en-US" smtClean="0"/>
+              <a:rPr lang="en-US"/>
               <a:t>Fifth level</a:t>
             </a:r>
-            <a:endParaRPr lang="en-US"/>
           </a:p>
         </p:txBody>
       </p:sp>
@@ -1236,9 +1233,9 @@
           <a:p>
             <a:fld id="{1AE64D37-BC85-964B-8C5D-8815EAD8EE1E}" type="datetimeFigureOut">
               <a:rPr lang="en-US" smtClean="0"/>
-              <a:t>11/21/17</a:t>
+              <a:t>12/4/2017</a:t>
             </a:fld>
-            <a:endParaRPr lang="en-US"/>
+            <a:endParaRPr lang="en-US" dirty="0"/>
           </a:p>
         </p:txBody>
       </p:sp>
@@ -1257,7 +1254,7 @@
           <a:bodyPr/>
           <a:lstStyle/>
           <a:p>
-            <a:endParaRPr lang="en-US"/>
+            <a:endParaRPr lang="en-US" dirty="0"/>
           </a:p>
         </p:txBody>
       </p:sp>
@@ -1280,7 +1277,7 @@
               <a:rPr lang="en-US" smtClean="0"/>
               <a:t>‹#›</a:t>
             </a:fld>
-            <a:endParaRPr lang="en-US"/>
+            <a:endParaRPr lang="en-US" dirty="0"/>
           </a:p>
         </p:txBody>
       </p:sp>
@@ -1335,10 +1332,9 @@
           <a:lstStyle/>
           <a:p>
             <a:r>
-              <a:rPr lang="en-US" smtClean="0"/>
+              <a:rPr lang="en-US"/>
               <a:t>Click to edit Master title style</a:t>
             </a:r>
-            <a:endParaRPr lang="en-US"/>
           </a:p>
         </p:txBody>
       </p:sp>
@@ -1401,7 +1397,7 @@
           <a:p>
             <a:pPr lvl="0"/>
             <a:r>
-              <a:rPr lang="en-US" smtClean="0"/>
+              <a:rPr lang="en-US"/>
               <a:t>Click to edit Master text styles</a:t>
             </a:r>
           </a:p>
@@ -1429,38 +1425,37 @@
           <a:p>
             <a:pPr lvl="0"/>
             <a:r>
-              <a:rPr lang="en-US" smtClean="0"/>
+              <a:rPr lang="en-US"/>
               <a:t>Click to edit Master text styles</a:t>
             </a:r>
           </a:p>
           <a:p>
             <a:pPr lvl="1"/>
             <a:r>
-              <a:rPr lang="en-US" smtClean="0"/>
+              <a:rPr lang="en-US"/>
               <a:t>Second level</a:t>
             </a:r>
           </a:p>
           <a:p>
             <a:pPr lvl="2"/>
             <a:r>
-              <a:rPr lang="en-US" smtClean="0"/>
+              <a:rPr lang="en-US"/>
               <a:t>Third level</a:t>
             </a:r>
           </a:p>
           <a:p>
             <a:pPr lvl="3"/>
             <a:r>
-              <a:rPr lang="en-US" smtClean="0"/>
+              <a:rPr lang="en-US"/>
               <a:t>Fourth level</a:t>
             </a:r>
           </a:p>
           <a:p>
             <a:pPr lvl="4"/>
             <a:r>
-              <a:rPr lang="en-US" smtClean="0"/>
+              <a:rPr lang="en-US"/>
               <a:t>Fifth level</a:t>
             </a:r>
-            <a:endParaRPr lang="en-US"/>
           </a:p>
         </p:txBody>
       </p:sp>
@@ -1523,7 +1518,7 @@
           <a:p>
             <a:pPr lvl="0"/>
             <a:r>
-              <a:rPr lang="en-US" smtClean="0"/>
+              <a:rPr lang="en-US"/>
               <a:t>Click to edit Master text styles</a:t>
             </a:r>
           </a:p>
@@ -1551,38 +1546,37 @@
           <a:p>
             <a:pPr lvl="0"/>
             <a:r>
-              <a:rPr lang="en-US" smtClean="0"/>
+              <a:rPr lang="en-US"/>
               <a:t>Click to edit Master text styles</a:t>
             </a:r>
           </a:p>
           <a:p>
             <a:pPr lvl="1"/>
             <a:r>
-              <a:rPr lang="en-US" smtClean="0"/>
+              <a:rPr lang="en-US"/>
               <a:t>Second level</a:t>
             </a:r>
           </a:p>
           <a:p>
             <a:pPr lvl="2"/>
             <a:r>
-              <a:rPr lang="en-US" smtClean="0"/>
+              <a:rPr lang="en-US"/>
               <a:t>Third level</a:t>
             </a:r>
           </a:p>
           <a:p>
             <a:pPr lvl="3"/>
             <a:r>
-              <a:rPr lang="en-US" smtClean="0"/>
+              <a:rPr lang="en-US"/>
               <a:t>Fourth level</a:t>
             </a:r>
           </a:p>
           <a:p>
             <a:pPr lvl="4"/>
             <a:r>
-              <a:rPr lang="en-US" smtClean="0"/>
+              <a:rPr lang="en-US"/>
               <a:t>Fifth level</a:t>
             </a:r>
-            <a:endParaRPr lang="en-US"/>
           </a:p>
         </p:txBody>
       </p:sp>
@@ -1603,9 +1597,9 @@
           <a:p>
             <a:fld id="{1AE64D37-BC85-964B-8C5D-8815EAD8EE1E}" type="datetimeFigureOut">
               <a:rPr lang="en-US" smtClean="0"/>
-              <a:t>11/21/17</a:t>
+              <a:t>12/4/2017</a:t>
             </a:fld>
-            <a:endParaRPr lang="en-US"/>
+            <a:endParaRPr lang="en-US" dirty="0"/>
           </a:p>
         </p:txBody>
       </p:sp>
@@ -1624,7 +1618,7 @@
           <a:bodyPr/>
           <a:lstStyle/>
           <a:p>
-            <a:endParaRPr lang="en-US"/>
+            <a:endParaRPr lang="en-US" dirty="0"/>
           </a:p>
         </p:txBody>
       </p:sp>
@@ -1647,7 +1641,7 @@
               <a:rPr lang="en-US" smtClean="0"/>
               <a:t>‹#›</a:t>
             </a:fld>
-            <a:endParaRPr lang="en-US"/>
+            <a:endParaRPr lang="en-US" dirty="0"/>
           </a:p>
         </p:txBody>
       </p:sp>
@@ -1697,10 +1691,9 @@
           <a:lstStyle/>
           <a:p>
             <a:r>
-              <a:rPr lang="en-US" smtClean="0"/>
+              <a:rPr lang="en-US"/>
               <a:t>Click to edit Master title style</a:t>
             </a:r>
-            <a:endParaRPr lang="en-US"/>
           </a:p>
         </p:txBody>
       </p:sp>
@@ -1721,9 +1714,9 @@
           <a:p>
             <a:fld id="{1AE64D37-BC85-964B-8C5D-8815EAD8EE1E}" type="datetimeFigureOut">
               <a:rPr lang="en-US" smtClean="0"/>
-              <a:t>11/21/17</a:t>
+              <a:t>12/4/2017</a:t>
             </a:fld>
-            <a:endParaRPr lang="en-US"/>
+            <a:endParaRPr lang="en-US" dirty="0"/>
           </a:p>
         </p:txBody>
       </p:sp>
@@ -1742,7 +1735,7 @@
           <a:bodyPr/>
           <a:lstStyle/>
           <a:p>
-            <a:endParaRPr lang="en-US"/>
+            <a:endParaRPr lang="en-US" dirty="0"/>
           </a:p>
         </p:txBody>
       </p:sp>
@@ -1765,7 +1758,7 @@
               <a:rPr lang="en-US" smtClean="0"/>
               <a:t>‹#›</a:t>
             </a:fld>
-            <a:endParaRPr lang="en-US"/>
+            <a:endParaRPr lang="en-US" dirty="0"/>
           </a:p>
         </p:txBody>
       </p:sp>
@@ -1816,9 +1809,9 @@
           <a:p>
             <a:fld id="{1AE64D37-BC85-964B-8C5D-8815EAD8EE1E}" type="datetimeFigureOut">
               <a:rPr lang="en-US" smtClean="0"/>
-              <a:t>11/21/17</a:t>
+              <a:t>12/4/2017</a:t>
             </a:fld>
-            <a:endParaRPr lang="en-US"/>
+            <a:endParaRPr lang="en-US" dirty="0"/>
           </a:p>
         </p:txBody>
       </p:sp>
@@ -1837,7 +1830,7 @@
           <a:bodyPr/>
           <a:lstStyle/>
           <a:p>
-            <a:endParaRPr lang="en-US"/>
+            <a:endParaRPr lang="en-US" dirty="0"/>
           </a:p>
         </p:txBody>
       </p:sp>
@@ -1860,7 +1853,7 @@
               <a:rPr lang="en-US" smtClean="0"/>
               <a:t>‹#›</a:t>
             </a:fld>
-            <a:endParaRPr lang="en-US"/>
+            <a:endParaRPr lang="en-US" dirty="0"/>
           </a:p>
         </p:txBody>
       </p:sp>
@@ -1919,10 +1912,9 @@
           </a:lstStyle>
           <a:p>
             <a:r>
-              <a:rPr lang="en-US" smtClean="0"/>
+              <a:rPr lang="en-US"/>
               <a:t>Click to edit Master title style</a:t>
             </a:r>
-            <a:endParaRPr lang="en-US"/>
           </a:p>
         </p:txBody>
       </p:sp>
@@ -1976,38 +1968,37 @@
           <a:p>
             <a:pPr lvl="0"/>
             <a:r>
-              <a:rPr lang="en-US" smtClean="0"/>
+              <a:rPr lang="en-US"/>
               <a:t>Click to edit Master text styles</a:t>
             </a:r>
           </a:p>
           <a:p>
             <a:pPr lvl="1"/>
             <a:r>
-              <a:rPr lang="en-US" smtClean="0"/>
+              <a:rPr lang="en-US"/>
               <a:t>Second level</a:t>
             </a:r>
           </a:p>
           <a:p>
             <a:pPr lvl="2"/>
             <a:r>
-              <a:rPr lang="en-US" smtClean="0"/>
+              <a:rPr lang="en-US"/>
               <a:t>Third level</a:t>
             </a:r>
           </a:p>
           <a:p>
             <a:pPr lvl="3"/>
             <a:r>
-              <a:rPr lang="en-US" smtClean="0"/>
+              <a:rPr lang="en-US"/>
               <a:t>Fourth level</a:t>
             </a:r>
           </a:p>
           <a:p>
             <a:pPr lvl="4"/>
             <a:r>
-              <a:rPr lang="en-US" smtClean="0"/>
+              <a:rPr lang="en-US"/>
               <a:t>Fifth level</a:t>
             </a:r>
-            <a:endParaRPr lang="en-US"/>
           </a:p>
         </p:txBody>
       </p:sp>
@@ -2070,7 +2061,7 @@
           <a:p>
             <a:pPr lvl="0"/>
             <a:r>
-              <a:rPr lang="en-US" smtClean="0"/>
+              <a:rPr lang="en-US"/>
               <a:t>Click to edit Master text styles</a:t>
             </a:r>
           </a:p>
@@ -2093,9 +2084,9 @@
           <a:p>
             <a:fld id="{1AE64D37-BC85-964B-8C5D-8815EAD8EE1E}" type="datetimeFigureOut">
               <a:rPr lang="en-US" smtClean="0"/>
-              <a:t>11/21/17</a:t>
+              <a:t>12/4/2017</a:t>
             </a:fld>
-            <a:endParaRPr lang="en-US"/>
+            <a:endParaRPr lang="en-US" dirty="0"/>
           </a:p>
         </p:txBody>
       </p:sp>
@@ -2114,7 +2105,7 @@
           <a:bodyPr/>
           <a:lstStyle/>
           <a:p>
-            <a:endParaRPr lang="en-US"/>
+            <a:endParaRPr lang="en-US" dirty="0"/>
           </a:p>
         </p:txBody>
       </p:sp>
@@ -2137,7 +2128,7 @@
               <a:rPr lang="en-US" smtClean="0"/>
               <a:t>‹#›</a:t>
             </a:fld>
-            <a:endParaRPr lang="en-US"/>
+            <a:endParaRPr lang="en-US" dirty="0"/>
           </a:p>
         </p:txBody>
       </p:sp>
@@ -2196,10 +2187,9 @@
           </a:lstStyle>
           <a:p>
             <a:r>
-              <a:rPr lang="en-US" smtClean="0"/>
+              <a:rPr lang="en-US"/>
               <a:t>Click to edit Master title style</a:t>
             </a:r>
-            <a:endParaRPr lang="en-US"/>
           </a:p>
         </p:txBody>
       </p:sp>
@@ -2260,7 +2250,7 @@
             </a:lvl9pPr>
           </a:lstStyle>
           <a:p>
-            <a:endParaRPr lang="en-US"/>
+            <a:endParaRPr lang="en-US" dirty="0"/>
           </a:p>
         </p:txBody>
       </p:sp>
@@ -2323,7 +2313,7 @@
           <a:p>
             <a:pPr lvl="0"/>
             <a:r>
-              <a:rPr lang="en-US" smtClean="0"/>
+              <a:rPr lang="en-US"/>
               <a:t>Click to edit Master text styles</a:t>
             </a:r>
           </a:p>
@@ -2346,9 +2336,9 @@
           <a:p>
             <a:fld id="{1AE64D37-BC85-964B-8C5D-8815EAD8EE1E}" type="datetimeFigureOut">
               <a:rPr lang="en-US" smtClean="0"/>
-              <a:t>11/21/17</a:t>
+              <a:t>12/4/2017</a:t>
             </a:fld>
-            <a:endParaRPr lang="en-US"/>
+            <a:endParaRPr lang="en-US" dirty="0"/>
           </a:p>
         </p:txBody>
       </p:sp>
@@ -2367,7 +2357,7 @@
           <a:bodyPr/>
           <a:lstStyle/>
           <a:p>
-            <a:endParaRPr lang="en-US"/>
+            <a:endParaRPr lang="en-US" dirty="0"/>
           </a:p>
         </p:txBody>
       </p:sp>
@@ -2390,7 +2380,7 @@
               <a:rPr lang="en-US" smtClean="0"/>
               <a:t>‹#›</a:t>
             </a:fld>
-            <a:endParaRPr lang="en-US"/>
+            <a:endParaRPr lang="en-US" dirty="0"/>
           </a:p>
         </p:txBody>
       </p:sp>
@@ -2455,10 +2445,9 @@
           <a:lstStyle/>
           <a:p>
             <a:r>
-              <a:rPr lang="en-US" smtClean="0"/>
+              <a:rPr lang="en-US"/>
               <a:t>Click to edit Master title style</a:t>
             </a:r>
-            <a:endParaRPr lang="en-US"/>
           </a:p>
         </p:txBody>
       </p:sp>
@@ -2489,38 +2478,37 @@
           <a:p>
             <a:pPr lvl="0"/>
             <a:r>
-              <a:rPr lang="en-US" smtClean="0"/>
+              <a:rPr lang="en-US"/>
               <a:t>Click to edit Master text styles</a:t>
             </a:r>
           </a:p>
           <a:p>
             <a:pPr lvl="1"/>
             <a:r>
-              <a:rPr lang="en-US" smtClean="0"/>
+              <a:rPr lang="en-US"/>
               <a:t>Second level</a:t>
             </a:r>
           </a:p>
           <a:p>
             <a:pPr lvl="2"/>
             <a:r>
-              <a:rPr lang="en-US" smtClean="0"/>
+              <a:rPr lang="en-US"/>
               <a:t>Third level</a:t>
             </a:r>
           </a:p>
           <a:p>
             <a:pPr lvl="3"/>
             <a:r>
-              <a:rPr lang="en-US" smtClean="0"/>
+              <a:rPr lang="en-US"/>
               <a:t>Fourth level</a:t>
             </a:r>
           </a:p>
           <a:p>
             <a:pPr lvl="4"/>
             <a:r>
-              <a:rPr lang="en-US" smtClean="0"/>
+              <a:rPr lang="en-US"/>
               <a:t>Fifth level</a:t>
             </a:r>
-            <a:endParaRPr lang="en-US"/>
           </a:p>
         </p:txBody>
       </p:sp>
@@ -2559,9 +2547,9 @@
           <a:p>
             <a:fld id="{1AE64D37-BC85-964B-8C5D-8815EAD8EE1E}" type="datetimeFigureOut">
               <a:rPr lang="en-US" smtClean="0"/>
-              <a:t>11/21/17</a:t>
+              <a:t>12/4/2017</a:t>
             </a:fld>
-            <a:endParaRPr lang="en-US"/>
+            <a:endParaRPr lang="en-US" dirty="0"/>
           </a:p>
         </p:txBody>
       </p:sp>
@@ -2598,7 +2586,7 @@
             </a:lvl1pPr>
           </a:lstStyle>
           <a:p>
-            <a:endParaRPr lang="en-US"/>
+            <a:endParaRPr lang="en-US" dirty="0"/>
           </a:p>
         </p:txBody>
       </p:sp>
@@ -2639,7 +2627,7 @@
               <a:rPr lang="en-US" smtClean="0"/>
               <a:t>‹#›</a:t>
             </a:fld>
-            <a:endParaRPr lang="en-US"/>
+            <a:endParaRPr lang="en-US" dirty="0"/>
           </a:p>
         </p:txBody>
       </p:sp>
@@ -3039,199 +3027,100 @@
             <a:lstStyle/>
             <a:p>
               <a:r>
-                <a:rPr lang="en-US" sz="1000" b="1" dirty="0" smtClean="0"/>
+                <a:rPr lang="en-US" sz="1000" b="1" dirty="0"/>
                 <a:t>Bike</a:t>
               </a:r>
             </a:p>
             <a:p>
               <a:r>
                 <a:rPr lang="en-US" sz="1000" b="1" dirty="0"/>
-                <a:t> </a:t>
-              </a:r>
-              <a:r>
-                <a:rPr lang="en-US" sz="1000" b="1" dirty="0" smtClean="0"/>
-                <a:t> </a:t>
-              </a:r>
-              <a:r>
-                <a:rPr lang="en-US" sz="1000" dirty="0" err="1" smtClean="0"/>
+                <a:t>  </a:t>
+              </a:r>
+              <a:r>
+                <a:rPr lang="en-US" sz="1000" u="sng" dirty="0"/>
                 <a:t>ModelName</a:t>
               </a:r>
-              <a:endParaRPr lang="en-US" sz="1000" dirty="0" smtClean="0"/>
             </a:p>
             <a:p>
               <a:r>
                 <a:rPr lang="en-US" sz="1000" dirty="0"/>
-                <a:t> </a:t>
-              </a:r>
-              <a:r>
-                <a:rPr lang="en-US" sz="1000" dirty="0" smtClean="0"/>
-                <a:t> </a:t>
-              </a:r>
-              <a:r>
-                <a:rPr lang="en-US" sz="1000" dirty="0" err="1" smtClean="0"/>
+                <a:t>  </a:t>
+              </a:r>
+              <a:r>
+                <a:rPr lang="en-US" sz="1000" u="sng" dirty="0"/>
                 <a:t>ManufacturerName</a:t>
               </a:r>
-              <a:endParaRPr lang="en-US" sz="1000" dirty="0" smtClean="0"/>
             </a:p>
             <a:p>
               <a:r>
                 <a:rPr lang="en-US" sz="1000" dirty="0"/>
-                <a:t> </a:t>
-              </a:r>
-              <a:r>
-                <a:rPr lang="en-US" sz="1000" dirty="0" smtClean="0"/>
-                <a:t> </a:t>
-              </a:r>
-              <a:r>
-                <a:rPr lang="en-US" sz="1000" dirty="0" err="1" smtClean="0"/>
-                <a:t>DerailleurID</a:t>
-              </a:r>
-              <a:endParaRPr lang="en-US" sz="1000" dirty="0" smtClean="0"/>
-            </a:p>
-            <a:p>
-              <a:r>
-                <a:rPr lang="en-US" sz="1000" dirty="0" smtClean="0"/>
-                <a:t>  </a:t>
-              </a:r>
-              <a:r>
-                <a:rPr lang="en-US" sz="1000" dirty="0" err="1" smtClean="0"/>
-                <a:t>RearShockID</a:t>
-              </a:r>
-              <a:endParaRPr lang="en-US" sz="1000" dirty="0" smtClean="0"/>
+                <a:t>  DerailleurID</a:t>
+              </a:r>
             </a:p>
             <a:p>
               <a:r>
                 <a:rPr lang="en-US" sz="1000" dirty="0"/>
-                <a:t> </a:t>
-              </a:r>
-              <a:r>
-                <a:rPr lang="en-US" sz="1000" dirty="0" smtClean="0"/>
-                <a:t> </a:t>
-              </a:r>
-              <a:r>
-                <a:rPr lang="en-US" sz="1000" dirty="0" err="1" smtClean="0"/>
-                <a:t>FrontShockId</a:t>
-              </a:r>
-              <a:endParaRPr lang="en-US" sz="1000" dirty="0" smtClean="0"/>
+                <a:t>  RearShockID</a:t>
+              </a:r>
             </a:p>
             <a:p>
               <a:r>
                 <a:rPr lang="en-US" sz="1000" dirty="0"/>
-                <a:t> </a:t>
-              </a:r>
-              <a:r>
-                <a:rPr lang="en-US" sz="1000" dirty="0" smtClean="0"/>
-                <a:t> </a:t>
-              </a:r>
-              <a:r>
-                <a:rPr lang="en-US" sz="1000" dirty="0" err="1" smtClean="0"/>
-                <a:t>BrakeID</a:t>
-              </a:r>
-              <a:endParaRPr lang="en-US" sz="1000" dirty="0" smtClean="0"/>
+                <a:t>  FrontShockId</a:t>
+              </a:r>
             </a:p>
             <a:p>
               <a:r>
                 <a:rPr lang="en-US" sz="1000" dirty="0"/>
-                <a:t> </a:t>
-              </a:r>
-              <a:r>
-                <a:rPr lang="en-US" sz="1000" dirty="0" smtClean="0"/>
-                <a:t> </a:t>
-              </a:r>
-              <a:r>
-                <a:rPr lang="en-US" sz="1000" dirty="0" err="1" smtClean="0"/>
-                <a:t>ShifterID</a:t>
-              </a:r>
-              <a:endParaRPr lang="en-US" sz="1000" dirty="0" smtClean="0"/>
+                <a:t>  BrakeID</a:t>
+              </a:r>
             </a:p>
             <a:p>
               <a:r>
                 <a:rPr lang="en-US" sz="1000" dirty="0"/>
-                <a:t> </a:t>
-              </a:r>
-              <a:r>
-                <a:rPr lang="en-US" sz="1000" dirty="0" smtClean="0"/>
-                <a:t> </a:t>
-              </a:r>
-              <a:r>
-                <a:rPr lang="en-US" sz="1000" dirty="0" err="1" smtClean="0"/>
-                <a:t>FrameID</a:t>
-              </a:r>
-              <a:endParaRPr lang="en-US" sz="1000" dirty="0" smtClean="0"/>
+                <a:t>  ShifterID</a:t>
+              </a:r>
             </a:p>
             <a:p>
               <a:r>
                 <a:rPr lang="en-US" sz="1000" dirty="0"/>
-                <a:t> </a:t>
-              </a:r>
-              <a:r>
-                <a:rPr lang="en-US" sz="1000" dirty="0" smtClean="0"/>
-                <a:t> </a:t>
-              </a:r>
-              <a:r>
-                <a:rPr lang="en-US" sz="1000" dirty="0" err="1" smtClean="0"/>
-                <a:t>WheelID</a:t>
-              </a:r>
-              <a:endParaRPr lang="en-US" sz="1000" dirty="0" smtClean="0"/>
+                <a:t>  FrameID</a:t>
+              </a:r>
             </a:p>
             <a:p>
               <a:r>
                 <a:rPr lang="en-US" sz="1000" dirty="0"/>
-                <a:t> </a:t>
-              </a:r>
-              <a:r>
-                <a:rPr lang="en-US" sz="1000" dirty="0" smtClean="0"/>
-                <a:t> </a:t>
-              </a:r>
-              <a:r>
-                <a:rPr lang="en-US" sz="1000" dirty="0" err="1" smtClean="0"/>
-                <a:t>CranksetID</a:t>
-              </a:r>
-              <a:endParaRPr lang="en-US" sz="1000" dirty="0" smtClean="0"/>
+                <a:t>  WheelID</a:t>
+              </a:r>
             </a:p>
             <a:p>
               <a:r>
                 <a:rPr lang="en-US" sz="1000" dirty="0"/>
-                <a:t> </a:t>
-              </a:r>
-              <a:r>
-                <a:rPr lang="en-US" sz="1000" dirty="0" smtClean="0"/>
-                <a:t> </a:t>
-              </a:r>
-              <a:r>
-                <a:rPr lang="en-US" sz="1000" dirty="0" err="1" smtClean="0"/>
-                <a:t>HandlebarID</a:t>
-              </a:r>
-              <a:endParaRPr lang="en-US" sz="1000" dirty="0" smtClean="0"/>
+                <a:t>  CranksetID</a:t>
+              </a:r>
             </a:p>
             <a:p>
               <a:r>
                 <a:rPr lang="en-US" sz="1000" dirty="0"/>
-                <a:t> </a:t>
-              </a:r>
-              <a:r>
-                <a:rPr lang="en-US" sz="1000" dirty="0" smtClean="0"/>
-                <a:t> price</a:t>
+                <a:t>  HandlebarID</a:t>
               </a:r>
             </a:p>
             <a:p>
               <a:r>
                 <a:rPr lang="en-US" sz="1000" dirty="0"/>
-                <a:t> </a:t>
-              </a:r>
-              <a:r>
-                <a:rPr lang="en-US" sz="1000" dirty="0" smtClean="0"/>
-                <a:t> year</a:t>
+                <a:t>  price</a:t>
               </a:r>
             </a:p>
             <a:p>
               <a:r>
                 <a:rPr lang="en-US" sz="1000" dirty="0"/>
-                <a:t> </a:t>
-              </a:r>
-              <a:r>
-                <a:rPr lang="en-US" sz="1000" dirty="0" smtClean="0"/>
-                <a:t> picture</a:t>
+                <a:t>  year</a:t>
+              </a:r>
+            </a:p>
+            <a:p>
+              <a:r>
+                <a:rPr lang="en-US" sz="1000" dirty="0"/>
+                <a:t>  picture</a:t>
               </a:r>
             </a:p>
           </p:txBody>
@@ -3246,9 +3135,9 @@
         <p:grpSpPr>
           <a:xfrm>
             <a:off x="4508405" y="521144"/>
-            <a:ext cx="1461248" cy="694471"/>
+            <a:ext cx="1461248" cy="707886"/>
             <a:chOff x="4647303" y="2452744"/>
-            <a:chExt cx="977153" cy="1635162"/>
+            <a:chExt cx="977153" cy="1666748"/>
           </a:xfrm>
         </p:grpSpPr>
         <p:sp>
@@ -3285,7 +3174,7 @@
             <a:lstStyle/>
             <a:p>
               <a:pPr algn="ctr"/>
-              <a:endParaRPr lang="en-US"/>
+              <a:endParaRPr lang="en-US" dirty="0"/>
             </a:p>
           </p:txBody>
         </p:sp>
@@ -3298,7 +3187,7 @@
           <p:spPr>
             <a:xfrm>
               <a:off x="4647303" y="2452744"/>
-              <a:ext cx="977153" cy="1304412"/>
+              <a:ext cx="977153" cy="1666748"/>
             </a:xfrm>
             <a:prstGeom prst="rect">
               <a:avLst/>
@@ -3312,24 +3201,29 @@
             <a:lstStyle/>
             <a:p>
               <a:r>
-                <a:rPr lang="en-US" sz="1000" b="1" smtClean="0"/>
+                <a:rPr lang="en-US" sz="1000" b="1" dirty="0"/>
                 <a:t>Derailleur</a:t>
               </a:r>
             </a:p>
             <a:p>
               <a:r>
-                <a:rPr lang="en-US" sz="1000" smtClean="0"/>
+                <a:rPr lang="en-US" sz="1000" dirty="0"/>
                 <a:t>   </a:t>
               </a:r>
               <a:r>
-                <a:rPr lang="en-US" sz="1000" err="1" smtClean="0"/>
+                <a:rPr lang="en-US" sz="1000" u="sng" dirty="0"/>
                 <a:t>DerailleurID</a:t>
               </a:r>
-              <a:endParaRPr lang="en-US" sz="1000" smtClean="0"/>
-            </a:p>
-            <a:p>
-              <a:r>
-                <a:rPr lang="en-US" sz="1000"/>
+            </a:p>
+            <a:p>
+              <a:r>
+                <a:rPr lang="en-US" sz="1000" dirty="0"/>
+                <a:t>   DerailleurFamily</a:t>
+              </a:r>
+            </a:p>
+            <a:p>
+              <a:r>
+                <a:rPr lang="en-US" sz="1000" dirty="0"/>
                 <a:t>	</a:t>
               </a:r>
             </a:p>
@@ -3384,7 +3278,7 @@
             <a:lstStyle/>
             <a:p>
               <a:pPr algn="ctr"/>
-              <a:endParaRPr lang="en-US"/>
+              <a:endParaRPr lang="en-US" dirty="0"/>
             </a:p>
           </p:txBody>
         </p:sp>
@@ -3411,39 +3305,29 @@
             <a:lstStyle/>
             <a:p>
               <a:r>
-                <a:rPr lang="en-US" sz="1000" b="1" smtClean="0"/>
+                <a:rPr lang="en-US" sz="1000" b="1" dirty="0"/>
                 <a:t>Brake</a:t>
               </a:r>
             </a:p>
             <a:p>
               <a:r>
-                <a:rPr lang="en-US" sz="1000" smtClean="0"/>
+                <a:rPr lang="en-US" sz="1000" dirty="0"/>
                 <a:t>   </a:t>
               </a:r>
               <a:r>
-                <a:rPr lang="en-US" sz="1000" err="1" smtClean="0"/>
+                <a:rPr lang="en-US" sz="1000" u="sng" dirty="0"/>
                 <a:t>BrakeID</a:t>
               </a:r>
-              <a:endParaRPr lang="en-US" sz="1000" smtClean="0"/>
-            </a:p>
-            <a:p>
-              <a:r>
-                <a:rPr lang="en-US" sz="1000"/>
-                <a:t> </a:t>
-              </a:r>
-              <a:r>
-                <a:rPr lang="en-US" sz="1000" smtClean="0"/>
-                <a:t>  </a:t>
-              </a:r>
-              <a:r>
-                <a:rPr lang="en-US" sz="1000" err="1" smtClean="0"/>
-                <a:t>BrakeType</a:t>
-              </a:r>
-              <a:endParaRPr lang="en-US" sz="1000" smtClean="0"/>
-            </a:p>
-            <a:p>
-              <a:r>
-                <a:rPr lang="en-US" sz="1000"/>
+            </a:p>
+            <a:p>
+              <a:r>
+                <a:rPr lang="en-US" sz="1000" dirty="0"/>
+                <a:t>   BrakeType</a:t>
+              </a:r>
+            </a:p>
+            <a:p>
+              <a:r>
+                <a:rPr lang="en-US" sz="1000" dirty="0"/>
                 <a:t>	</a:t>
               </a:r>
             </a:p>
@@ -3498,7 +3382,7 @@
             <a:lstStyle/>
             <a:p>
               <a:pPr algn="ctr"/>
-              <a:endParaRPr lang="en-US"/>
+              <a:endParaRPr lang="en-US" dirty="0"/>
             </a:p>
           </p:txBody>
         </p:sp>
@@ -3525,40 +3409,35 @@
             <a:lstStyle/>
             <a:p>
               <a:r>
-                <a:rPr lang="en-US" sz="1000" b="1" smtClean="0"/>
+                <a:rPr lang="en-US" sz="1000" b="1" dirty="0"/>
                 <a:t>Manufacturer</a:t>
               </a:r>
             </a:p>
             <a:p>
               <a:r>
-                <a:rPr lang="en-US" sz="1000" smtClean="0"/>
+                <a:rPr lang="en-US" sz="1000" dirty="0"/>
                 <a:t>   </a:t>
               </a:r>
               <a:r>
-                <a:rPr lang="en-US" sz="1000" err="1" smtClean="0"/>
+                <a:rPr lang="en-US" sz="1000" u="sng" dirty="0"/>
                 <a:t>ManufacturerName</a:t>
               </a:r>
-              <a:endParaRPr lang="en-US" sz="1000" smtClean="0"/>
-            </a:p>
-            <a:p>
-              <a:r>
-                <a:rPr lang="en-US" sz="1000" smtClean="0"/>
+            </a:p>
+            <a:p>
+              <a:r>
+                <a:rPr lang="en-US" sz="1000" dirty="0"/>
                 <a:t>   Address</a:t>
               </a:r>
             </a:p>
             <a:p>
               <a:r>
-                <a:rPr lang="en-US" sz="1000"/>
-                <a:t> </a:t>
-              </a:r>
-              <a:r>
-                <a:rPr lang="en-US" sz="1000" smtClean="0"/>
-                <a:t>  Website</a:t>
-              </a:r>
-            </a:p>
-            <a:p>
-              <a:r>
-                <a:rPr lang="en-US" sz="1000"/>
+                <a:rPr lang="en-US" sz="1000" dirty="0"/>
+                <a:t>   Website</a:t>
+              </a:r>
+            </a:p>
+            <a:p>
+              <a:r>
+                <a:rPr lang="en-US" sz="1000" dirty="0"/>
                 <a:t>	</a:t>
               </a:r>
             </a:p>
@@ -3613,7 +3492,7 @@
             <a:lstStyle/>
             <a:p>
               <a:pPr algn="ctr"/>
-              <a:endParaRPr lang="en-US"/>
+              <a:endParaRPr lang="en-US" dirty="0"/>
             </a:p>
           </p:txBody>
         </p:sp>
@@ -3640,36 +3519,33 @@
             <a:lstStyle/>
             <a:p>
               <a:r>
-                <a:rPr lang="en-US" sz="1000" b="1" err="1" smtClean="0"/>
+                <a:rPr lang="en-US" sz="1000" b="1" dirty="0"/>
                 <a:t>RearShock</a:t>
               </a:r>
-              <a:endParaRPr lang="en-US" sz="1000" b="1" smtClean="0"/>
-            </a:p>
-            <a:p>
-              <a:r>
-                <a:rPr lang="en-US" sz="1000" smtClean="0"/>
+            </a:p>
+            <a:p>
+              <a:r>
+                <a:rPr lang="en-US" sz="1000" dirty="0"/>
                 <a:t>   </a:t>
               </a:r>
               <a:r>
-                <a:rPr lang="en-US" sz="1000" err="1" smtClean="0"/>
+                <a:rPr lang="en-US" sz="1000" u="sng" dirty="0"/>
                 <a:t>RearShockID</a:t>
               </a:r>
-              <a:endParaRPr lang="en-US" sz="1000" smtClean="0"/>
-            </a:p>
-            <a:p>
-              <a:r>
-                <a:rPr lang="en-US" sz="1000" smtClean="0"/>
+            </a:p>
+            <a:p>
+              <a:r>
+                <a:rPr lang="en-US" sz="1000" dirty="0"/>
                 <a:t>   </a:t>
               </a:r>
               <a:r>
-                <a:rPr lang="en-US" sz="1000" err="1" smtClean="0"/>
-                <a:t>travel_mm</a:t>
-              </a:r>
-              <a:endParaRPr lang="en-US" sz="1000" smtClean="0"/>
-            </a:p>
-            <a:p>
-              <a:r>
-                <a:rPr lang="en-US" sz="1000"/>
+                <a:rPr lang="en-US" sz="1000" u="sng" dirty="0"/>
+                <a:t>rs_travel_mm</a:t>
+              </a:r>
+            </a:p>
+            <a:p>
+              <a:r>
+                <a:rPr lang="en-US" sz="1000" dirty="0"/>
                 <a:t>	</a:t>
               </a:r>
             </a:p>
@@ -3724,7 +3600,7 @@
             <a:lstStyle/>
             <a:p>
               <a:pPr algn="ctr"/>
-              <a:endParaRPr lang="en-US"/>
+              <a:endParaRPr lang="en-US" dirty="0"/>
             </a:p>
           </p:txBody>
         </p:sp>
@@ -3751,40 +3627,33 @@
             <a:lstStyle/>
             <a:p>
               <a:r>
-                <a:rPr lang="en-US" sz="1000" b="1" err="1" smtClean="0"/>
+                <a:rPr lang="en-US" sz="1000" b="1" dirty="0"/>
                 <a:t>FrontShock</a:t>
               </a:r>
-              <a:endParaRPr lang="en-US" sz="1000" b="1" smtClean="0"/>
-            </a:p>
-            <a:p>
-              <a:r>
-                <a:rPr lang="en-US" sz="1000" smtClean="0"/>
+            </a:p>
+            <a:p>
+              <a:r>
+                <a:rPr lang="en-US" sz="1000" dirty="0"/>
                 <a:t>   </a:t>
               </a:r>
               <a:r>
-                <a:rPr lang="en-US" sz="1000" err="1" smtClean="0"/>
-                <a:t>FrontShockOD</a:t>
-              </a:r>
-              <a:endParaRPr lang="en-US" sz="1000" smtClean="0"/>
-            </a:p>
-            <a:p>
-              <a:r>
-                <a:rPr lang="en-US" sz="1000"/>
-                <a:t> </a:t>
-              </a:r>
-              <a:r>
-                <a:rPr lang="en-US" sz="1000" smtClean="0"/>
-                <a:t>  </a:t>
-              </a:r>
-              <a:r>
-                <a:rPr lang="en-US" sz="1000" err="1" smtClean="0"/>
-                <a:t>travel_mm</a:t>
-              </a:r>
-              <a:endParaRPr lang="en-US" sz="1000" smtClean="0"/>
-            </a:p>
-            <a:p>
-              <a:r>
-                <a:rPr lang="en-US" sz="1000"/>
+                <a:rPr lang="en-US" sz="1000" u="sng" dirty="0"/>
+                <a:t>FrontShockID</a:t>
+              </a:r>
+            </a:p>
+            <a:p>
+              <a:r>
+                <a:rPr lang="en-US" sz="1000" dirty="0"/>
+                <a:t>   </a:t>
+              </a:r>
+              <a:r>
+                <a:rPr lang="en-US" sz="1000" u="sng" dirty="0"/>
+                <a:t>fs_travel_mm</a:t>
+              </a:r>
+            </a:p>
+            <a:p>
+              <a:r>
+                <a:rPr lang="en-US" sz="1000" dirty="0"/>
                 <a:t>	</a:t>
               </a:r>
             </a:p>
@@ -3839,7 +3708,7 @@
             <a:lstStyle/>
             <a:p>
               <a:pPr algn="ctr"/>
-              <a:endParaRPr lang="en-US"/>
+              <a:endParaRPr lang="en-US" dirty="0"/>
             </a:p>
           </p:txBody>
         </p:sp>
@@ -3866,34 +3735,29 @@
             <a:lstStyle/>
             <a:p>
               <a:r>
-                <a:rPr lang="en-US" sz="1000" b="1" smtClean="0"/>
+                <a:rPr lang="en-US" sz="1000" b="1" dirty="0"/>
                 <a:t>Shifter</a:t>
               </a:r>
             </a:p>
             <a:p>
               <a:r>
-                <a:rPr lang="en-US" sz="1000" smtClean="0"/>
+                <a:rPr lang="en-US" sz="1000" dirty="0"/>
                 <a:t>   </a:t>
               </a:r>
               <a:r>
-                <a:rPr lang="en-US" sz="1000" err="1" smtClean="0"/>
+                <a:rPr lang="en-US" sz="1000" u="sng" dirty="0"/>
                 <a:t>ShifterID</a:t>
               </a:r>
-              <a:endParaRPr lang="en-US" sz="1000" smtClean="0"/>
-            </a:p>
-            <a:p>
-              <a:r>
-                <a:rPr lang="en-US" sz="1000"/>
-                <a:t> </a:t>
-              </a:r>
-              <a:r>
-                <a:rPr lang="en-US" sz="1000" smtClean="0"/>
-                <a:t>  Family</a:t>
-              </a:r>
-            </a:p>
-            <a:p>
-              <a:r>
-                <a:rPr lang="en-US" sz="1000"/>
+            </a:p>
+            <a:p>
+              <a:r>
+                <a:rPr lang="en-US" sz="1000" dirty="0"/>
+                <a:t>   Family</a:t>
+              </a:r>
+            </a:p>
+            <a:p>
+              <a:r>
+                <a:rPr lang="en-US" sz="1000" dirty="0"/>
                 <a:t>	</a:t>
               </a:r>
             </a:p>
@@ -3948,7 +3812,7 @@
             <a:lstStyle/>
             <a:p>
               <a:pPr algn="ctr"/>
-              <a:endParaRPr lang="en-US"/>
+              <a:endParaRPr lang="en-US" dirty="0"/>
             </a:p>
           </p:txBody>
         </p:sp>
@@ -3975,54 +3839,39 @@
             <a:lstStyle/>
             <a:p>
               <a:r>
-                <a:rPr lang="en-US" sz="1000" b="1" smtClean="0"/>
+                <a:rPr lang="en-US" sz="1000" b="1" dirty="0"/>
                 <a:t>Frame</a:t>
               </a:r>
             </a:p>
             <a:p>
               <a:r>
-                <a:rPr lang="en-US" sz="1000" smtClean="0"/>
+                <a:rPr lang="en-US" sz="1000" dirty="0"/>
                 <a:t>   </a:t>
               </a:r>
               <a:r>
-                <a:rPr lang="en-US" sz="1000" err="1" smtClean="0"/>
+                <a:rPr lang="en-US" sz="1000" u="sng" dirty="0"/>
                 <a:t>FrameID</a:t>
               </a:r>
-              <a:endParaRPr lang="en-US" sz="1000" smtClean="0"/>
-            </a:p>
-            <a:p>
-              <a:r>
-                <a:rPr lang="en-US" sz="1000"/>
-                <a:t> </a:t>
-              </a:r>
-              <a:r>
-                <a:rPr lang="en-US" sz="1000" smtClean="0"/>
-                <a:t>  </a:t>
-              </a:r>
-              <a:r>
-                <a:rPr lang="en-US" sz="1000" err="1" smtClean="0"/>
+            </a:p>
+            <a:p>
+              <a:r>
+                <a:rPr lang="en-US" sz="1000" dirty="0"/>
+                <a:t>   </a:t>
+              </a:r>
+              <a:r>
+                <a:rPr lang="en-US" sz="1000" u="sng" dirty="0"/>
                 <a:t>FrameType</a:t>
               </a:r>
-              <a:endParaRPr lang="en-US" sz="1000" smtClean="0"/>
-            </a:p>
-            <a:p>
-              <a:r>
-                <a:rPr lang="en-US" sz="1000"/>
-                <a:t> </a:t>
-              </a:r>
-              <a:r>
-                <a:rPr lang="en-US" sz="1000" smtClean="0"/>
-                <a:t>  </a:t>
-              </a:r>
-              <a:r>
-                <a:rPr lang="en-US" sz="1000" err="1" smtClean="0"/>
-                <a:t>MaterialType</a:t>
-              </a:r>
-              <a:endParaRPr lang="en-US" sz="1000" smtClean="0"/>
-            </a:p>
-            <a:p>
-              <a:r>
-                <a:rPr lang="en-US" sz="1000"/>
+            </a:p>
+            <a:p>
+              <a:r>
+                <a:rPr lang="en-US" sz="1000" dirty="0"/>
+                <a:t>   MaterialType</a:t>
+              </a:r>
+            </a:p>
+            <a:p>
+              <a:r>
+                <a:rPr lang="en-US" sz="1000" dirty="0"/>
                 <a:t>	</a:t>
               </a:r>
             </a:p>
@@ -4038,9 +3887,9 @@
         <p:grpSpPr>
           <a:xfrm>
             <a:off x="537824" y="4921172"/>
-            <a:ext cx="1461248" cy="694471"/>
+            <a:ext cx="1461248" cy="707886"/>
             <a:chOff x="4647303" y="2452744"/>
-            <a:chExt cx="977153" cy="1635162"/>
+            <a:chExt cx="977153" cy="1666748"/>
           </a:xfrm>
         </p:grpSpPr>
         <p:sp>
@@ -4077,7 +3926,7 @@
             <a:lstStyle/>
             <a:p>
               <a:pPr algn="ctr"/>
-              <a:endParaRPr lang="en-US"/>
+              <a:endParaRPr lang="en-US" dirty="0"/>
             </a:p>
           </p:txBody>
         </p:sp>
@@ -4090,7 +3939,7 @@
           <p:spPr>
             <a:xfrm>
               <a:off x="4647303" y="2452744"/>
-              <a:ext cx="977153" cy="1304412"/>
+              <a:ext cx="977153" cy="1666748"/>
             </a:xfrm>
             <a:prstGeom prst="rect">
               <a:avLst/>
@@ -4104,24 +3953,29 @@
             <a:lstStyle/>
             <a:p>
               <a:r>
-                <a:rPr lang="en-US" sz="1000" b="1" smtClean="0"/>
+                <a:rPr lang="en-US" sz="1000" b="1" dirty="0"/>
                 <a:t>Crankset</a:t>
               </a:r>
             </a:p>
             <a:p>
               <a:r>
-                <a:rPr lang="en-US" sz="1000" smtClean="0"/>
+                <a:rPr lang="en-US" sz="1000" dirty="0"/>
                 <a:t>   </a:t>
               </a:r>
               <a:r>
-                <a:rPr lang="en-US" sz="1000" err="1" smtClean="0"/>
+                <a:rPr lang="en-US" sz="1000" u="sng" dirty="0"/>
                 <a:t>CranksetID</a:t>
               </a:r>
-              <a:endParaRPr lang="en-US" sz="1000" smtClean="0"/>
-            </a:p>
-            <a:p>
-              <a:r>
-                <a:rPr lang="en-US" sz="1000"/>
+            </a:p>
+            <a:p>
+              <a:r>
+                <a:rPr lang="en-US" sz="1000" dirty="0"/>
+                <a:t>   CranksetLength</a:t>
+              </a:r>
+            </a:p>
+            <a:p>
+              <a:r>
+                <a:rPr lang="en-US" sz="1000" dirty="0"/>
                 <a:t>	</a:t>
               </a:r>
             </a:p>
@@ -4176,7 +4030,7 @@
             <a:lstStyle/>
             <a:p>
               <a:pPr algn="ctr"/>
-              <a:endParaRPr lang="en-US"/>
+              <a:endParaRPr lang="en-US" dirty="0"/>
             </a:p>
           </p:txBody>
         </p:sp>
@@ -4203,49 +4057,39 @@
             <a:lstStyle/>
             <a:p>
               <a:r>
-                <a:rPr lang="en-US" sz="1000" b="1" smtClean="0"/>
+                <a:rPr lang="en-US" sz="1000" b="1" dirty="0"/>
                 <a:t>Handlebar</a:t>
               </a:r>
             </a:p>
             <a:p>
               <a:r>
-                <a:rPr lang="en-US" sz="1000" smtClean="0"/>
+                <a:rPr lang="en-US" sz="1000" dirty="0"/>
                 <a:t>   </a:t>
               </a:r>
               <a:r>
-                <a:rPr lang="en-US" sz="1000" err="1" smtClean="0"/>
+                <a:rPr lang="en-US" sz="1000" u="sng" dirty="0"/>
                 <a:t>HandlebarID</a:t>
               </a:r>
-              <a:endParaRPr lang="en-US" sz="1000" smtClean="0"/>
-            </a:p>
-            <a:p>
-              <a:r>
-                <a:rPr lang="en-US" sz="1000"/>
-                <a:t> </a:t>
-              </a:r>
-              <a:r>
-                <a:rPr lang="en-US" sz="1000" smtClean="0"/>
-                <a:t>  Width</a:t>
-              </a:r>
-            </a:p>
-            <a:p>
-              <a:r>
-                <a:rPr lang="en-US" sz="1000"/>
-                <a:t> </a:t>
-              </a:r>
-              <a:r>
-                <a:rPr lang="en-US" sz="1000" smtClean="0"/>
-                <a:t>  </a:t>
-              </a:r>
-              <a:r>
-                <a:rPr lang="en-US" sz="1000" err="1" smtClean="0"/>
-                <a:t>MaterialType</a:t>
-              </a:r>
-              <a:endParaRPr lang="en-US" sz="1000" smtClean="0"/>
-            </a:p>
-            <a:p>
-              <a:r>
-                <a:rPr lang="en-US" sz="1000"/>
+            </a:p>
+            <a:p>
+              <a:r>
+                <a:rPr lang="en-US" sz="1000" dirty="0"/>
+                <a:t>   </a:t>
+              </a:r>
+              <a:r>
+                <a:rPr lang="en-US" sz="1000" u="sng" dirty="0"/>
+                <a:t>Width</a:t>
+              </a:r>
+            </a:p>
+            <a:p>
+              <a:r>
+                <a:rPr lang="en-US" sz="1000" dirty="0"/>
+                <a:t>   MaterialType</a:t>
+              </a:r>
+            </a:p>
+            <a:p>
+              <a:r>
+                <a:rPr lang="en-US" sz="1000" dirty="0"/>
                 <a:t>	</a:t>
               </a:r>
             </a:p>
@@ -4300,7 +4144,7 @@
             <a:lstStyle/>
             <a:p>
               <a:pPr algn="ctr"/>
-              <a:endParaRPr lang="en-US"/>
+              <a:endParaRPr lang="en-US" dirty="0"/>
             </a:p>
           </p:txBody>
         </p:sp>
@@ -4327,39 +4171,33 @@
             <a:lstStyle/>
             <a:p>
               <a:r>
-                <a:rPr lang="en-US" sz="1000" b="1" smtClean="0"/>
+                <a:rPr lang="en-US" sz="1000" b="1" dirty="0"/>
                 <a:t>Wheel</a:t>
               </a:r>
             </a:p>
             <a:p>
               <a:r>
-                <a:rPr lang="en-US" sz="1000" smtClean="0"/>
+                <a:rPr lang="en-US" sz="1000" dirty="0"/>
                 <a:t>   </a:t>
               </a:r>
               <a:r>
-                <a:rPr lang="en-US" sz="1000" err="1" smtClean="0"/>
+                <a:rPr lang="en-US" sz="1000" u="sng" dirty="0"/>
                 <a:t>WheelID</a:t>
               </a:r>
-              <a:endParaRPr lang="en-US" sz="1000" smtClean="0"/>
-            </a:p>
-            <a:p>
-              <a:r>
-                <a:rPr lang="en-US" sz="1000"/>
-                <a:t> </a:t>
-              </a:r>
-              <a:r>
-                <a:rPr lang="en-US" sz="1000" smtClean="0"/>
-                <a:t>  </a:t>
-              </a:r>
-              <a:r>
-                <a:rPr lang="en-US" sz="1000" err="1" smtClean="0"/>
+            </a:p>
+            <a:p>
+              <a:r>
+                <a:rPr lang="en-US" sz="1000" dirty="0"/>
+                <a:t>   </a:t>
+              </a:r>
+              <a:r>
+                <a:rPr lang="en-US" sz="1000" u="sng" dirty="0"/>
                 <a:t>WheelSize</a:t>
               </a:r>
-              <a:endParaRPr lang="en-US" sz="1000" smtClean="0"/>
-            </a:p>
-            <a:p>
-              <a:r>
-                <a:rPr lang="en-US" sz="1000"/>
+            </a:p>
+            <a:p>
+              <a:r>
+                <a:rPr lang="en-US" sz="1000" dirty="0"/>
                 <a:t>	</a:t>
               </a:r>
             </a:p>
@@ -4414,7 +4252,7 @@
             <a:lstStyle/>
             <a:p>
               <a:pPr algn="ctr"/>
-              <a:endParaRPr lang="en-US"/>
+              <a:endParaRPr lang="en-US" dirty="0"/>
             </a:p>
           </p:txBody>
         </p:sp>
@@ -4466,7 +4304,7 @@
               <a:lstStyle/>
               <a:p>
                 <a:pPr algn="ctr"/>
-                <a:endParaRPr lang="en-US"/>
+                <a:endParaRPr lang="en-US" dirty="0"/>
               </a:p>
             </p:txBody>
           </p:sp>
@@ -4494,10 +4332,9 @@
               <a:p>
                 <a:pPr algn="ctr"/>
                 <a:r>
-                  <a:rPr lang="en-US" sz="1000" err="1" smtClean="0"/>
+                  <a:rPr lang="en-US" sz="1000" dirty="0"/>
                   <a:t>bike_manufacturer</a:t>
                 </a:r>
-                <a:endParaRPr lang="en-US" sz="1000"/>
               </a:p>
             </p:txBody>
           </p:sp>
@@ -4551,7 +4388,7 @@
             <a:lstStyle/>
             <a:p>
               <a:pPr algn="ctr"/>
-              <a:endParaRPr lang="en-US"/>
+              <a:endParaRPr lang="en-US" dirty="0"/>
             </a:p>
           </p:txBody>
         </p:sp>
@@ -4579,10 +4416,9 @@
             <a:p>
               <a:pPr algn="ctr"/>
               <a:r>
-                <a:rPr lang="en-US" sz="1000" err="1" smtClean="0"/>
+                <a:rPr lang="en-US" sz="1000" dirty="0"/>
                 <a:t>bike_derailleur</a:t>
               </a:r>
-              <a:endParaRPr lang="en-US" sz="1000"/>
             </a:p>
           </p:txBody>
         </p:sp>
@@ -4635,7 +4471,7 @@
             <a:lstStyle/>
             <a:p>
               <a:pPr algn="ctr"/>
-              <a:endParaRPr lang="en-US"/>
+              <a:endParaRPr lang="en-US" dirty="0"/>
             </a:p>
           </p:txBody>
         </p:sp>
@@ -4687,7 +4523,7 @@
               <a:lstStyle/>
               <a:p>
                 <a:pPr algn="ctr"/>
-                <a:endParaRPr lang="en-US"/>
+                <a:endParaRPr lang="en-US" dirty="0"/>
               </a:p>
             </p:txBody>
           </p:sp>
@@ -4715,10 +4551,9 @@
               <a:p>
                 <a:pPr algn="ctr"/>
                 <a:r>
-                  <a:rPr lang="en-US" sz="1000" err="1" smtClean="0"/>
+                  <a:rPr lang="en-US" sz="1000" dirty="0"/>
                   <a:t>bike_wheel</a:t>
                 </a:r>
-                <a:endParaRPr lang="en-US" sz="1000"/>
               </a:p>
             </p:txBody>
           </p:sp>
@@ -4772,7 +4607,7 @@
             <a:lstStyle/>
             <a:p>
               <a:pPr algn="ctr"/>
-              <a:endParaRPr lang="en-US"/>
+              <a:endParaRPr lang="en-US" dirty="0"/>
             </a:p>
           </p:txBody>
         </p:sp>
@@ -4824,7 +4659,7 @@
               <a:lstStyle/>
               <a:p>
                 <a:pPr algn="ctr"/>
-                <a:endParaRPr lang="en-US"/>
+                <a:endParaRPr lang="en-US" dirty="0"/>
               </a:p>
             </p:txBody>
           </p:sp>
@@ -4852,10 +4687,9 @@
               <a:p>
                 <a:pPr algn="ctr"/>
                 <a:r>
-                  <a:rPr lang="en-US" sz="1000" err="1" smtClean="0"/>
+                  <a:rPr lang="en-US" sz="1000" dirty="0"/>
                   <a:t>bike_handlebar</a:t>
                 </a:r>
-                <a:endParaRPr lang="en-US" sz="1000"/>
               </a:p>
             </p:txBody>
           </p:sp>
@@ -4909,7 +4743,7 @@
             <a:lstStyle/>
             <a:p>
               <a:pPr algn="ctr"/>
-              <a:endParaRPr lang="en-US"/>
+              <a:endParaRPr lang="en-US" dirty="0"/>
             </a:p>
           </p:txBody>
         </p:sp>
@@ -4961,7 +4795,7 @@
               <a:lstStyle/>
               <a:p>
                 <a:pPr algn="ctr"/>
-                <a:endParaRPr lang="en-US"/>
+                <a:endParaRPr lang="en-US" dirty="0"/>
               </a:p>
             </p:txBody>
           </p:sp>
@@ -4989,10 +4823,9 @@
               <a:p>
                 <a:pPr algn="ctr"/>
                 <a:r>
-                  <a:rPr lang="en-US" sz="1000" err="1" smtClean="0"/>
+                  <a:rPr lang="en-US" sz="1000" dirty="0"/>
                   <a:t>bike_crankset</a:t>
                 </a:r>
-                <a:endParaRPr lang="en-US" sz="1000"/>
               </a:p>
             </p:txBody>
           </p:sp>
@@ -5046,7 +4879,7 @@
             <a:lstStyle/>
             <a:p>
               <a:pPr algn="ctr"/>
-              <a:endParaRPr lang="en-US"/>
+              <a:endParaRPr lang="en-US" dirty="0"/>
             </a:p>
           </p:txBody>
         </p:sp>
@@ -5098,7 +4931,7 @@
               <a:lstStyle/>
               <a:p>
                 <a:pPr algn="ctr"/>
-                <a:endParaRPr lang="en-US"/>
+                <a:endParaRPr lang="en-US" dirty="0"/>
               </a:p>
             </p:txBody>
           </p:sp>
@@ -5126,10 +4959,9 @@
               <a:p>
                 <a:pPr algn="ctr"/>
                 <a:r>
-                  <a:rPr lang="en-US" sz="1000" err="1" smtClean="0"/>
+                  <a:rPr lang="en-US" sz="1000" dirty="0"/>
                   <a:t>bike_frame</a:t>
                 </a:r>
-                <a:endParaRPr lang="en-US" sz="1000"/>
               </a:p>
             </p:txBody>
           </p:sp>
@@ -5183,7 +5015,7 @@
             <a:lstStyle/>
             <a:p>
               <a:pPr algn="ctr"/>
-              <a:endParaRPr lang="en-US"/>
+              <a:endParaRPr lang="en-US" dirty="0"/>
             </a:p>
           </p:txBody>
         </p:sp>
@@ -5211,10 +5043,9 @@
             <a:p>
               <a:pPr algn="ctr"/>
               <a:r>
-                <a:rPr lang="en-US" sz="1000" err="1" smtClean="0"/>
+                <a:rPr lang="en-US" sz="1000" dirty="0"/>
                 <a:t>bike_rearshock</a:t>
               </a:r>
-              <a:endParaRPr lang="en-US" sz="1000"/>
             </a:p>
           </p:txBody>
         </p:sp>
@@ -5267,7 +5098,7 @@
             <a:lstStyle/>
             <a:p>
               <a:pPr algn="ctr"/>
-              <a:endParaRPr lang="en-US"/>
+              <a:endParaRPr lang="en-US" dirty="0"/>
             </a:p>
           </p:txBody>
         </p:sp>
@@ -5295,10 +5126,9 @@
             <a:p>
               <a:pPr algn="ctr"/>
               <a:r>
-                <a:rPr lang="en-US" sz="1000" err="1" smtClean="0"/>
+                <a:rPr lang="en-US" sz="1000" dirty="0"/>
                 <a:t>bike_frontshock</a:t>
               </a:r>
-              <a:endParaRPr lang="en-US" sz="1000"/>
             </a:p>
           </p:txBody>
         </p:sp>
@@ -5351,7 +5181,7 @@
             <a:lstStyle/>
             <a:p>
               <a:pPr algn="ctr"/>
-              <a:endParaRPr lang="en-US"/>
+              <a:endParaRPr lang="en-US" dirty="0"/>
             </a:p>
           </p:txBody>
         </p:sp>
@@ -5379,10 +5209,9 @@
             <a:p>
               <a:pPr algn="ctr"/>
               <a:r>
-                <a:rPr lang="en-US" sz="1000" err="1" smtClean="0"/>
+                <a:rPr lang="en-US" sz="1000" dirty="0"/>
                 <a:t>bike_brake</a:t>
               </a:r>
-              <a:endParaRPr lang="en-US" sz="1000"/>
             </a:p>
           </p:txBody>
         </p:sp>
@@ -5435,7 +5264,7 @@
             <a:lstStyle/>
             <a:p>
               <a:pPr algn="ctr"/>
-              <a:endParaRPr lang="en-US"/>
+              <a:endParaRPr lang="en-US" dirty="0"/>
             </a:p>
           </p:txBody>
         </p:sp>
@@ -5463,10 +5292,9 @@
             <a:p>
               <a:pPr algn="ctr"/>
               <a:r>
-                <a:rPr lang="en-US" sz="1000" err="1" smtClean="0"/>
+                <a:rPr lang="en-US" sz="1000" dirty="0"/>
                 <a:t>bike_shifter</a:t>
               </a:r>
-              <a:endParaRPr lang="en-US" sz="1000"/>
             </a:p>
           </p:txBody>
         </p:sp>
@@ -6199,13 +6027,6 @@
   <p:clrMapOvr>
     <a:masterClrMapping/>
   </p:clrMapOvr>
-  <p:timing>
-    <p:tnLst>
-      <p:par>
-        <p:cTn id="1" dur="indefinite" restart="never" nodeType="tmRoot"/>
-      </p:par>
-    </p:tnLst>
-  </p:timing>
 </p:sld>
 </file>
 

</xml_diff>